<commit_message>
Mostly done? Time for second breakfast
</commit_message>
<xml_diff>
--- a/Presentation_PythonEvolution.pptx
+++ b/Presentation_PythonEvolution.pptx
@@ -5,7 +5,7 @@
     <p:sldMasterId id="2147483660" r:id="rId1"/>
   </p:sldMasterIdLst>
   <p:notesMasterIdLst>
-    <p:notesMasterId r:id="rId14"/>
+    <p:notesMasterId r:id="rId13"/>
   </p:notesMasterIdLst>
   <p:sldIdLst>
     <p:sldId id="256" r:id="rId2"/>
@@ -14,12 +14,11 @@
     <p:sldId id="259" r:id="rId5"/>
     <p:sldId id="260" r:id="rId6"/>
     <p:sldId id="261" r:id="rId7"/>
-    <p:sldId id="262" r:id="rId8"/>
-    <p:sldId id="264" r:id="rId9"/>
-    <p:sldId id="265" r:id="rId10"/>
-    <p:sldId id="266" r:id="rId11"/>
-    <p:sldId id="267" r:id="rId12"/>
-    <p:sldId id="263" r:id="rId13"/>
+    <p:sldId id="264" r:id="rId8"/>
+    <p:sldId id="265" r:id="rId9"/>
+    <p:sldId id="266" r:id="rId10"/>
+    <p:sldId id="267" r:id="rId11"/>
+    <p:sldId id="263" r:id="rId12"/>
   </p:sldIdLst>
   <p:sldSz cx="9144000" cy="6858000" type="screen4x3"/>
   <p:notesSz cx="6858000" cy="9144000"/>
@@ -641,8 +640,27 @@
           <a:p>
             <a:r>
               <a:rPr lang="en-CA" baseline="0" dirty="0" smtClean="0"/>
-              <a:t>Three things contribute to a language’s strength – source code, projects built using it, and of course the user base</a:t>
-            </a:r>
+              <a:t>Three things contribute to a language’s strength – source </a:t>
+            </a:r>
+            <a:r>
+              <a:rPr lang="en-CA" baseline="0" dirty="0" smtClean="0"/>
+              <a:t>code (itself split into two parts), </a:t>
+            </a:r>
+            <a:r>
+              <a:rPr lang="en-CA" baseline="0" dirty="0" smtClean="0"/>
+              <a:t>projects built using it, and of course the user </a:t>
+            </a:r>
+            <a:r>
+              <a:rPr lang="en-CA" baseline="0" dirty="0" smtClean="0"/>
+              <a:t>base.</a:t>
+            </a:r>
+          </a:p>
+          <a:p>
+            <a:r>
+              <a:rPr lang="en-CA" baseline="0" dirty="0" smtClean="0"/>
+              <a:t>Of course, this means I had 3 methodologies</a:t>
+            </a:r>
+            <a:endParaRPr lang="en-CA" baseline="0" dirty="0" smtClean="0"/>
           </a:p>
         </p:txBody>
       </p:sp>
@@ -728,11 +746,36 @@
           <a:p>
             <a:r>
               <a:rPr lang="en-CA" dirty="0" smtClean="0"/>
-              <a:t>Why chosen – Looked at metrics like</a:t>
+              <a:t>A.1 – Wanted to see</a:t>
             </a:r>
             <a:r>
               <a:rPr lang="en-CA" baseline="0" dirty="0" smtClean="0"/>
-              <a:t> LINES OF CODE, NUMBER OF SPECIAL CHARACTERS, DEVELOPMENT TIME, etc.</a:t>
+              <a:t> a visualization of the Python structure changes</a:t>
+            </a:r>
+            <a:endParaRPr lang="en-CA" dirty="0" smtClean="0"/>
+          </a:p>
+          <a:p>
+            <a:r>
+              <a:rPr lang="en-CA" dirty="0" smtClean="0"/>
+              <a:t>A.2 </a:t>
+            </a:r>
+            <a:r>
+              <a:rPr lang="en-CA" baseline="0" dirty="0" smtClean="0"/>
+              <a:t>- </a:t>
+            </a:r>
+            <a:r>
+              <a:rPr lang="en-CA" dirty="0" smtClean="0"/>
+              <a:t>Script: Parsed the official Python website</a:t>
+            </a:r>
+            <a:r>
+              <a:rPr lang="en-CA" baseline="0" dirty="0" smtClean="0"/>
+              <a:t> for version release downloads </a:t>
+            </a:r>
+          </a:p>
+          <a:p>
+            <a:r>
+              <a:rPr lang="en-CA" baseline="0" dirty="0" smtClean="0"/>
+              <a:t>B - </a:t>
             </a:r>
             <a:endParaRPr lang="en-CA" dirty="0"/>
           </a:p>
@@ -755,7 +798,7 @@
           <a:p>
             <a:fld id="{AC97A31A-494B-4294-92D6-FCE47D759DCC}" type="slidenum">
               <a:rPr lang="en-CA" smtClean="0"/>
-              <a:t>5</a:t>
+              <a:t>4</a:t>
             </a:fld>
             <a:endParaRPr lang="en-CA"/>
           </a:p>
@@ -764,7 +807,7 @@
     </p:spTree>
     <p:extLst>
       <p:ext uri="{BB962C8B-B14F-4D97-AF65-F5344CB8AC3E}">
-        <p14:creationId xmlns:p14="http://schemas.microsoft.com/office/powerpoint/2010/main" val="1797517551"/>
+        <p14:creationId xmlns:p14="http://schemas.microsoft.com/office/powerpoint/2010/main" val="858480668"/>
       </p:ext>
     </p:extLst>
   </p:cSld>
@@ -820,19 +863,11 @@
           <a:p>
             <a:r>
               <a:rPr lang="en-CA" dirty="0" smtClean="0"/>
-              <a:t>Where</a:t>
+              <a:t>Why chosen – Looked at metrics like</a:t>
             </a:r>
             <a:r>
               <a:rPr lang="en-CA" baseline="0" dirty="0" smtClean="0"/>
-              <a:t> – industry: </a:t>
-            </a:r>
-            <a:r>
-              <a:rPr lang="en-CA" baseline="0" dirty="0" err="1" smtClean="0"/>
-              <a:t>Pyconferences</a:t>
-            </a:r>
-            <a:r>
-              <a:rPr lang="en-CA" baseline="0" dirty="0" smtClean="0"/>
-              <a:t> ; academics/general public: Hour of Code campaign(s)</a:t>
+              <a:t> LINES OF CODE, NUMBER OF SPECIAL CHARACTERS, DEVELOPMENT TIME, etc.</a:t>
             </a:r>
             <a:endParaRPr lang="en-CA" dirty="0"/>
           </a:p>
@@ -855,7 +890,7 @@
           <a:p>
             <a:fld id="{AC97A31A-494B-4294-92D6-FCE47D759DCC}" type="slidenum">
               <a:rPr lang="en-CA" smtClean="0"/>
-              <a:t>6</a:t>
+              <a:t>5</a:t>
             </a:fld>
             <a:endParaRPr lang="en-CA"/>
           </a:p>
@@ -864,7 +899,7 @@
     </p:spTree>
     <p:extLst>
       <p:ext uri="{BB962C8B-B14F-4D97-AF65-F5344CB8AC3E}">
-        <p14:creationId xmlns:p14="http://schemas.microsoft.com/office/powerpoint/2010/main" val="4289745208"/>
+        <p14:creationId xmlns:p14="http://schemas.microsoft.com/office/powerpoint/2010/main" val="1797517551"/>
       </p:ext>
     </p:extLst>
   </p:cSld>
@@ -918,14 +953,6 @@
           <a:bodyPr/>
           <a:lstStyle/>
           <a:p>
-            <a:r>
-              <a:rPr lang="en-CA" dirty="0" smtClean="0"/>
-              <a:t>M1 had</a:t>
-            </a:r>
-            <a:r>
-              <a:rPr lang="en-CA" baseline="0" dirty="0" smtClean="0"/>
-              <a:t> a TON of data! Lots of numbers and facts, but I’m not sure how I could have reduced it further.</a:t>
-            </a:r>
             <a:endParaRPr lang="en-CA" dirty="0"/>
           </a:p>
         </p:txBody>
@@ -947,7 +974,7 @@
           <a:p>
             <a:fld id="{AC97A31A-494B-4294-92D6-FCE47D759DCC}" type="slidenum">
               <a:rPr lang="en-CA" smtClean="0"/>
-              <a:t>7</a:t>
+              <a:t>6</a:t>
             </a:fld>
             <a:endParaRPr lang="en-CA"/>
           </a:p>
@@ -956,7 +983,7 @@
     </p:spTree>
     <p:extLst>
       <p:ext uri="{BB962C8B-B14F-4D97-AF65-F5344CB8AC3E}">
-        <p14:creationId xmlns:p14="http://schemas.microsoft.com/office/powerpoint/2010/main" val="3774740369"/>
+        <p14:creationId xmlns:p14="http://schemas.microsoft.com/office/powerpoint/2010/main" val="4289745208"/>
       </p:ext>
     </p:extLst>
   </p:cSld>
@@ -1012,6 +1039,274 @@
           <a:p>
             <a:r>
               <a:rPr lang="en-CA" dirty="0" smtClean="0"/>
+              <a:t>Problem: I wanted to see and</a:t>
+            </a:r>
+            <a:r>
+              <a:rPr lang="en-CA" baseline="0" dirty="0" smtClean="0"/>
+              <a:t> chart the history of Python packages. The Python version source page download table has the name, date, and download file size of each version as its released. Packages only had most recent – My resulting graphs are somewhat misrepresentative – show the dates and number of files updated on that date (number of active; number that update WITH Python?)</a:t>
+            </a:r>
+            <a:endParaRPr lang="en-CA" dirty="0"/>
+          </a:p>
+        </p:txBody>
+      </p:sp>
+      <p:sp>
+        <p:nvSpPr>
+          <p:cNvPr id="4" name="Slide Number Placeholder 3"/>
+          <p:cNvSpPr>
+            <a:spLocks noGrp="1"/>
+          </p:cNvSpPr>
+          <p:nvPr>
+            <p:ph type="sldNum" sz="quarter" idx="10"/>
+          </p:nvPr>
+        </p:nvSpPr>
+        <p:spPr/>
+        <p:txBody>
+          <a:bodyPr/>
+          <a:lstStyle/>
+          <a:p>
+            <a:fld id="{AC97A31A-494B-4294-92D6-FCE47D759DCC}" type="slidenum">
+              <a:rPr lang="en-CA" smtClean="0"/>
+              <a:t>8</a:t>
+            </a:fld>
+            <a:endParaRPr lang="en-CA"/>
+          </a:p>
+        </p:txBody>
+      </p:sp>
+    </p:spTree>
+    <p:extLst>
+      <p:ext uri="{BB962C8B-B14F-4D97-AF65-F5344CB8AC3E}">
+        <p14:creationId xmlns:p14="http://schemas.microsoft.com/office/powerpoint/2010/main" val="126568707"/>
+      </p:ext>
+    </p:extLst>
+  </p:cSld>
+  <p:clrMapOvr>
+    <a:masterClrMapping/>
+  </p:clrMapOvr>
+</p:notes>
+</file>
+
+<file path=ppt/notesSlides/notesSlide7.xml><?xml version="1.0" encoding="utf-8"?>
+<p:notes xmlns:a="http://schemas.openxmlformats.org/drawingml/2006/main" xmlns:r="http://schemas.openxmlformats.org/officeDocument/2006/relationships" xmlns:p="http://schemas.openxmlformats.org/presentationml/2006/main">
+  <p:cSld>
+    <p:spTree>
+      <p:nvGrpSpPr>
+        <p:cNvPr id="1" name=""/>
+        <p:cNvGrpSpPr/>
+        <p:nvPr/>
+      </p:nvGrpSpPr>
+      <p:grpSpPr>
+        <a:xfrm>
+          <a:off x="0" y="0"/>
+          <a:ext cx="0" cy="0"/>
+          <a:chOff x="0" y="0"/>
+          <a:chExt cx="0" cy="0"/>
+        </a:xfrm>
+      </p:grpSpPr>
+      <p:sp>
+        <p:nvSpPr>
+          <p:cNvPr id="2" name="Slide Image Placeholder 1"/>
+          <p:cNvSpPr>
+            <a:spLocks noGrp="1" noRot="1" noChangeAspect="1"/>
+          </p:cNvSpPr>
+          <p:nvPr>
+            <p:ph type="sldImg"/>
+          </p:nvPr>
+        </p:nvSpPr>
+        <p:spPr/>
+      </p:sp>
+      <p:sp>
+        <p:nvSpPr>
+          <p:cNvPr id="3" name="Notes Placeholder 2"/>
+          <p:cNvSpPr>
+            <a:spLocks noGrp="1"/>
+          </p:cNvSpPr>
+          <p:nvPr>
+            <p:ph type="body" idx="1"/>
+          </p:nvPr>
+        </p:nvSpPr>
+        <p:spPr/>
+        <p:txBody>
+          <a:bodyPr/>
+          <a:lstStyle/>
+          <a:p>
+            <a:r>
+              <a:rPr lang="en-CA" dirty="0" smtClean="0"/>
+              <a:t>SUPPORTED PROJECTS RESULTS</a:t>
+            </a:r>
+            <a:endParaRPr lang="en-CA" dirty="0"/>
+          </a:p>
+        </p:txBody>
+      </p:sp>
+      <p:sp>
+        <p:nvSpPr>
+          <p:cNvPr id="4" name="Slide Number Placeholder 3"/>
+          <p:cNvSpPr>
+            <a:spLocks noGrp="1"/>
+          </p:cNvSpPr>
+          <p:nvPr>
+            <p:ph type="sldNum" sz="quarter" idx="10"/>
+          </p:nvPr>
+        </p:nvSpPr>
+        <p:spPr/>
+        <p:txBody>
+          <a:bodyPr/>
+          <a:lstStyle/>
+          <a:p>
+            <a:fld id="{AC97A31A-494B-4294-92D6-FCE47D759DCC}" type="slidenum">
+              <a:rPr lang="en-CA" smtClean="0"/>
+              <a:t>9</a:t>
+            </a:fld>
+            <a:endParaRPr lang="en-CA"/>
+          </a:p>
+        </p:txBody>
+      </p:sp>
+    </p:spTree>
+    <p:extLst>
+      <p:ext uri="{BB962C8B-B14F-4D97-AF65-F5344CB8AC3E}">
+        <p14:creationId xmlns:p14="http://schemas.microsoft.com/office/powerpoint/2010/main" val="1428497804"/>
+      </p:ext>
+    </p:extLst>
+  </p:cSld>
+  <p:clrMapOvr>
+    <a:masterClrMapping/>
+  </p:clrMapOvr>
+</p:notes>
+</file>
+
+<file path=ppt/notesSlides/notesSlide8.xml><?xml version="1.0" encoding="utf-8"?>
+<p:notes xmlns:a="http://schemas.openxmlformats.org/drawingml/2006/main" xmlns:r="http://schemas.openxmlformats.org/officeDocument/2006/relationships" xmlns:p="http://schemas.openxmlformats.org/presentationml/2006/main">
+  <p:cSld>
+    <p:spTree>
+      <p:nvGrpSpPr>
+        <p:cNvPr id="1" name=""/>
+        <p:cNvGrpSpPr/>
+        <p:nvPr/>
+      </p:nvGrpSpPr>
+      <p:grpSpPr>
+        <a:xfrm>
+          <a:off x="0" y="0"/>
+          <a:ext cx="0" cy="0"/>
+          <a:chOff x="0" y="0"/>
+          <a:chExt cx="0" cy="0"/>
+        </a:xfrm>
+      </p:grpSpPr>
+      <p:sp>
+        <p:nvSpPr>
+          <p:cNvPr id="2" name="Slide Image Placeholder 1"/>
+          <p:cNvSpPr>
+            <a:spLocks noGrp="1" noRot="1" noChangeAspect="1"/>
+          </p:cNvSpPr>
+          <p:nvPr>
+            <p:ph type="sldImg"/>
+          </p:nvPr>
+        </p:nvSpPr>
+        <p:spPr/>
+      </p:sp>
+      <p:sp>
+        <p:nvSpPr>
+          <p:cNvPr id="3" name="Notes Placeholder 2"/>
+          <p:cNvSpPr>
+            <a:spLocks noGrp="1"/>
+          </p:cNvSpPr>
+          <p:nvPr>
+            <p:ph type="body" idx="1"/>
+          </p:nvPr>
+        </p:nvSpPr>
+        <p:spPr/>
+        <p:txBody>
+          <a:bodyPr/>
+          <a:lstStyle/>
+          <a:p>
+            <a:r>
+              <a:rPr lang="en-CA" dirty="0" smtClean="0"/>
+              <a:t>USER BASE / COMMUNITY</a:t>
+            </a:r>
+            <a:endParaRPr lang="en-CA" dirty="0"/>
+          </a:p>
+        </p:txBody>
+      </p:sp>
+      <p:sp>
+        <p:nvSpPr>
+          <p:cNvPr id="4" name="Slide Number Placeholder 3"/>
+          <p:cNvSpPr>
+            <a:spLocks noGrp="1"/>
+          </p:cNvSpPr>
+          <p:nvPr>
+            <p:ph type="sldNum" sz="quarter" idx="10"/>
+          </p:nvPr>
+        </p:nvSpPr>
+        <p:spPr/>
+        <p:txBody>
+          <a:bodyPr/>
+          <a:lstStyle/>
+          <a:p>
+            <a:fld id="{AC97A31A-494B-4294-92D6-FCE47D759DCC}" type="slidenum">
+              <a:rPr lang="en-CA" smtClean="0"/>
+              <a:t>10</a:t>
+            </a:fld>
+            <a:endParaRPr lang="en-CA"/>
+          </a:p>
+        </p:txBody>
+      </p:sp>
+    </p:spTree>
+    <p:extLst>
+      <p:ext uri="{BB962C8B-B14F-4D97-AF65-F5344CB8AC3E}">
+        <p14:creationId xmlns:p14="http://schemas.microsoft.com/office/powerpoint/2010/main" val="1925934031"/>
+      </p:ext>
+    </p:extLst>
+  </p:cSld>
+  <p:clrMapOvr>
+    <a:masterClrMapping/>
+  </p:clrMapOvr>
+</p:notes>
+</file>
+
+<file path=ppt/notesSlides/notesSlide9.xml><?xml version="1.0" encoding="utf-8"?>
+<p:notes xmlns:a="http://schemas.openxmlformats.org/drawingml/2006/main" xmlns:r="http://schemas.openxmlformats.org/officeDocument/2006/relationships" xmlns:p="http://schemas.openxmlformats.org/presentationml/2006/main">
+  <p:cSld>
+    <p:spTree>
+      <p:nvGrpSpPr>
+        <p:cNvPr id="1" name=""/>
+        <p:cNvGrpSpPr/>
+        <p:nvPr/>
+      </p:nvGrpSpPr>
+      <p:grpSpPr>
+        <a:xfrm>
+          <a:off x="0" y="0"/>
+          <a:ext cx="0" cy="0"/>
+          <a:chOff x="0" y="0"/>
+          <a:chExt cx="0" cy="0"/>
+        </a:xfrm>
+      </p:grpSpPr>
+      <p:sp>
+        <p:nvSpPr>
+          <p:cNvPr id="2" name="Slide Image Placeholder 1"/>
+          <p:cNvSpPr>
+            <a:spLocks noGrp="1" noRot="1" noChangeAspect="1"/>
+          </p:cNvSpPr>
+          <p:nvPr>
+            <p:ph type="sldImg"/>
+          </p:nvPr>
+        </p:nvSpPr>
+        <p:spPr/>
+      </p:sp>
+      <p:sp>
+        <p:nvSpPr>
+          <p:cNvPr id="3" name="Notes Placeholder 2"/>
+          <p:cNvSpPr>
+            <a:spLocks noGrp="1"/>
+          </p:cNvSpPr>
+          <p:nvPr>
+            <p:ph type="body" idx="1"/>
+          </p:nvPr>
+        </p:nvSpPr>
+        <p:spPr/>
+        <p:txBody>
+          <a:bodyPr/>
+          <a:lstStyle/>
+          <a:p>
+            <a:r>
+              <a:rPr lang="en-CA" dirty="0" smtClean="0"/>
               <a:t>This was a very meta-project</a:t>
             </a:r>
             <a:r>
@@ -1039,7 +1334,7 @@
           <a:p>
             <a:fld id="{AC97A31A-494B-4294-92D6-FCE47D759DCC}" type="slidenum">
               <a:rPr lang="en-CA" smtClean="0"/>
-              <a:t>12</a:t>
+              <a:t>11</a:t>
             </a:fld>
             <a:endParaRPr lang="en-CA"/>
           </a:p>
@@ -5859,6 +6154,13 @@
   <p:clrMapOvr>
     <a:masterClrMapping/>
   </p:clrMapOvr>
+  <p:timing>
+    <p:tnLst>
+      <p:par>
+        <p:cTn id="1" dur="indefinite" restart="never" nodeType="tmRoot"/>
+      </p:par>
+    </p:tnLst>
+  </p:timing>
 </p:sld>
 </file>
 
@@ -5896,7 +6198,7 @@
           <a:p>
             <a:r>
               <a:rPr lang="en-CA" dirty="0" smtClean="0"/>
-              <a:t>RESULTS – M2</a:t>
+              <a:t>RESULTS – M3</a:t>
             </a:r>
             <a:endParaRPr lang="en-CA" dirty="0"/>
           </a:p>
@@ -5914,144 +6216,9 @@
         </p:nvSpPr>
         <p:spPr/>
         <p:txBody>
-          <a:bodyPr/>
-          <a:lstStyle/>
-          <a:p>
-            <a:r>
-              <a:rPr lang="en-CA" dirty="0" smtClean="0"/>
-              <a:t> </a:t>
-            </a:r>
-            <a:r>
-              <a:rPr lang="en-CA" dirty="0"/>
-              <a:t>Not show that Python itself had evolved </a:t>
-            </a:r>
-            <a:endParaRPr lang="en-CA" dirty="0" smtClean="0"/>
-          </a:p>
-          <a:p>
-            <a:r>
-              <a:rPr lang="en-CA" dirty="0" smtClean="0"/>
-              <a:t>Python </a:t>
-            </a:r>
-            <a:r>
-              <a:rPr lang="en-CA" dirty="0"/>
-              <a:t>has just been chosen for </a:t>
-            </a:r>
-            <a:r>
-              <a:rPr lang="en-CA" dirty="0" smtClean="0"/>
-              <a:t>use</a:t>
-            </a:r>
-          </a:p>
-          <a:p>
-            <a:r>
-              <a:rPr lang="en-CA" dirty="0" smtClean="0"/>
-              <a:t>Indirectly </a:t>
-            </a:r>
-            <a:r>
-              <a:rPr lang="en-CA" dirty="0"/>
-              <a:t>asserted Law VIII (feedback)</a:t>
-            </a:r>
-          </a:p>
-          <a:p>
-            <a:endParaRPr lang="en-CA" dirty="0"/>
-          </a:p>
-        </p:txBody>
-      </p:sp>
-      <p:pic>
-        <p:nvPicPr>
-          <p:cNvPr id="4" name="Picture 3"/>
-          <p:cNvPicPr>
-            <a:picLocks noChangeAspect="1"/>
-          </p:cNvPicPr>
-          <p:nvPr/>
-        </p:nvPicPr>
-        <p:blipFill>
-          <a:blip r:embed="rId2">
-            <a:extLst>
-              <a:ext uri="{28A0092B-C50C-407E-A947-70E740481C1C}">
-                <a14:useLocalDpi xmlns:a14="http://schemas.microsoft.com/office/drawing/2010/main" val="0"/>
-              </a:ext>
-            </a:extLst>
-          </a:blip>
-          <a:stretch>
-            <a:fillRect/>
-          </a:stretch>
-        </p:blipFill>
-        <p:spPr>
-          <a:xfrm>
-            <a:off x="2000250" y="2132856"/>
-            <a:ext cx="5143500" cy="2857500"/>
-          </a:xfrm>
-          <a:prstGeom prst="rect">
-            <a:avLst/>
-          </a:prstGeom>
-        </p:spPr>
-      </p:pic>
-    </p:spTree>
-    <p:extLst>
-      <p:ext uri="{BB962C8B-B14F-4D97-AF65-F5344CB8AC3E}">
-        <p14:creationId xmlns:p14="http://schemas.microsoft.com/office/powerpoint/2010/main" val="3521685727"/>
-      </p:ext>
-    </p:extLst>
-  </p:cSld>
-  <p:clrMapOvr>
-    <a:masterClrMapping/>
-  </p:clrMapOvr>
-</p:sld>
-</file>
-
-<file path=ppt/slides/slide11.xml><?xml version="1.0" encoding="utf-8"?>
-<p:sld xmlns:a="http://schemas.openxmlformats.org/drawingml/2006/main" xmlns:r="http://schemas.openxmlformats.org/officeDocument/2006/relationships" xmlns:p="http://schemas.openxmlformats.org/presentationml/2006/main">
-  <p:cSld>
-    <p:spTree>
-      <p:nvGrpSpPr>
-        <p:cNvPr id="1" name=""/>
-        <p:cNvGrpSpPr/>
-        <p:nvPr/>
-      </p:nvGrpSpPr>
-      <p:grpSpPr>
-        <a:xfrm>
-          <a:off x="0" y="0"/>
-          <a:ext cx="0" cy="0"/>
-          <a:chOff x="0" y="0"/>
-          <a:chExt cx="0" cy="0"/>
-        </a:xfrm>
-      </p:grpSpPr>
-      <p:sp>
-        <p:nvSpPr>
-          <p:cNvPr id="2" name="Title 1"/>
-          <p:cNvSpPr>
-            <a:spLocks noGrp="1"/>
-          </p:cNvSpPr>
-          <p:nvPr>
-            <p:ph type="title"/>
-          </p:nvPr>
-        </p:nvSpPr>
-        <p:spPr/>
-        <p:txBody>
-          <a:bodyPr/>
-          <a:lstStyle/>
-          <a:p>
-            <a:r>
-              <a:rPr lang="en-CA" dirty="0" smtClean="0"/>
-              <a:t>RESULTS – M3</a:t>
-            </a:r>
-            <a:endParaRPr lang="en-CA" dirty="0"/>
-          </a:p>
-        </p:txBody>
-      </p:sp>
-      <p:sp>
-        <p:nvSpPr>
-          <p:cNvPr id="3" name="Content Placeholder 2"/>
-          <p:cNvSpPr>
-            <a:spLocks noGrp="1"/>
-          </p:cNvSpPr>
-          <p:nvPr>
-            <p:ph idx="1"/>
-          </p:nvPr>
-        </p:nvSpPr>
-        <p:spPr/>
-        <p:txBody>
-          <a:bodyPr/>
+          <a:bodyPr>
+            <a:normAutofit/>
+          </a:bodyPr>
           <a:lstStyle/>
           <a:p>
             <a:pPr>
@@ -6059,16 +6226,20 @@
               <a:buChar char="•"/>
             </a:pPr>
             <a:r>
-              <a:rPr lang="en-CA" dirty="0" smtClean="0"/>
+              <a:rPr lang="en-CA" sz="2000" dirty="0" smtClean="0"/>
               <a:t>Effects </a:t>
             </a:r>
             <a:r>
-              <a:rPr lang="en-CA" dirty="0"/>
+              <a:rPr lang="en-CA" sz="2000" dirty="0"/>
               <a:t>have not yet been </a:t>
             </a:r>
             <a:r>
-              <a:rPr lang="en-CA" dirty="0" smtClean="0"/>
-              <a:t>seen (Recent Data)</a:t>
+              <a:rPr lang="en-CA" sz="2000" dirty="0" smtClean="0"/>
+              <a:t>seen (Recent Data</a:t>
+            </a:r>
+            <a:r>
+              <a:rPr lang="en-CA" sz="2000" dirty="0" smtClean="0"/>
+              <a:t>)</a:t>
             </a:r>
           </a:p>
           <a:p>
@@ -6076,7 +6247,7 @@
               <a:buFont typeface="Arial" panose="020B0604020202020204" pitchFamily="34" charset="0"/>
               <a:buChar char="•"/>
             </a:pPr>
-            <a:endParaRPr lang="en-CA" dirty="0"/>
+            <a:endParaRPr lang="en-CA" sz="2000" dirty="0" smtClean="0"/>
           </a:p>
           <a:p>
             <a:pPr>
@@ -6084,16 +6255,33 @@
               <a:buChar char="•"/>
             </a:pPr>
             <a:r>
-              <a:rPr lang="en-CA" dirty="0"/>
+              <a:rPr lang="en-CA" sz="2000" dirty="0" smtClean="0"/>
+              <a:t>No pretty pictures, sorry.</a:t>
+            </a:r>
+          </a:p>
+          <a:p>
+            <a:pPr>
+              <a:buFont typeface="Arial" panose="020B0604020202020204" pitchFamily="34" charset="0"/>
+              <a:buChar char="•"/>
+            </a:pPr>
+            <a:endParaRPr lang="en-CA" sz="2000" dirty="0"/>
+          </a:p>
+          <a:p>
+            <a:pPr>
+              <a:buFont typeface="Arial" panose="020B0604020202020204" pitchFamily="34" charset="0"/>
+              <a:buChar char="•"/>
+            </a:pPr>
+            <a:r>
+              <a:rPr lang="en-CA" sz="2000" dirty="0"/>
               <a:t>C</a:t>
             </a:r>
             <a:r>
-              <a:rPr lang="en-CA" dirty="0" smtClean="0"/>
+              <a:rPr lang="en-CA" sz="2000" dirty="0" smtClean="0"/>
               <a:t>lear shift from industry to general domain</a:t>
             </a:r>
           </a:p>
           <a:p>
-            <a:endParaRPr lang="en-CA" dirty="0"/>
+            <a:endParaRPr lang="en-CA" sz="2000" dirty="0"/>
           </a:p>
         </p:txBody>
       </p:sp>
@@ -6110,7 +6298,7 @@
 </p:sld>
 </file>
 
-<file path=ppt/slides/slide12.xml><?xml version="1.0" encoding="utf-8"?>
+<file path=ppt/slides/slide11.xml><?xml version="1.0" encoding="utf-8"?>
 <p:sld xmlns:a="http://schemas.openxmlformats.org/drawingml/2006/main" xmlns:r="http://schemas.openxmlformats.org/officeDocument/2006/relationships" xmlns:p="http://schemas.openxmlformats.org/presentationml/2006/main">
   <p:cSld>
     <p:spTree>
@@ -6283,21 +6471,21 @@
         </p:nvSpPr>
         <p:spPr>
           <a:xfrm>
-            <a:off x="1763688" y="2348880"/>
-            <a:ext cx="5904656" cy="675413"/>
+            <a:off x="1403648" y="2492896"/>
+            <a:ext cx="6840760" cy="675413"/>
           </a:xfrm>
         </p:spPr>
         <p:txBody>
           <a:bodyPr>
-            <a:normAutofit/>
+            <a:noAutofit/>
           </a:bodyPr>
           <a:lstStyle/>
           <a:p>
             <a:r>
-              <a:rPr lang="en-CA" sz="2500" dirty="0" smtClean="0"/>
+              <a:rPr lang="en-CA" sz="3000" dirty="0" smtClean="0"/>
               <a:t>How has Python become stronger?</a:t>
             </a:r>
-            <a:endParaRPr lang="en-CA" sz="2500" dirty="0"/>
+            <a:endParaRPr lang="en-CA" sz="3000" dirty="0"/>
           </a:p>
         </p:txBody>
       </p:sp>
@@ -6311,6 +6499,13 @@
   <p:clrMapOvr>
     <a:masterClrMapping/>
   </p:clrMapOvr>
+  <p:timing>
+    <p:tnLst>
+      <p:par>
+        <p:cTn id="1" dur="indefinite" restart="never" nodeType="tmRoot"/>
+      </p:par>
+    </p:tnLst>
+  </p:timing>
 </p:sld>
 </file>
 
@@ -6341,15 +6536,23 @@
             <p:ph type="title"/>
           </p:nvPr>
         </p:nvSpPr>
-        <p:spPr/>
+        <p:spPr>
+          <a:xfrm>
+            <a:off x="611560" y="548680"/>
+            <a:ext cx="7925504" cy="764704"/>
+          </a:xfrm>
+        </p:spPr>
         <p:txBody>
           <a:bodyPr/>
           <a:lstStyle/>
           <a:p>
             <a:r>
-              <a:rPr lang="en-CA" dirty="0" smtClean="0"/>
-              <a:t>Three things:</a:t>
-            </a:r>
+              <a:rPr lang="en-CA" dirty="0"/>
+              <a:t>Solution: Research, not an automated tool</a:t>
+            </a:r>
+            <a:br>
+              <a:rPr lang="en-CA" dirty="0"/>
+            </a:br>
             <a:endParaRPr lang="en-CA" dirty="0"/>
           </a:p>
         </p:txBody>
@@ -6364,12 +6567,28 @@
             <p:ph idx="1"/>
           </p:nvPr>
         </p:nvSpPr>
-        <p:spPr/>
+        <p:spPr>
+          <a:xfrm>
+            <a:off x="611560" y="1556792"/>
+            <a:ext cx="7920880" cy="2760420"/>
+          </a:xfrm>
+        </p:spPr>
         <p:txBody>
           <a:bodyPr>
-            <a:normAutofit/>
+            <a:normAutofit fontScale="92500" lnSpcReduction="10000"/>
           </a:bodyPr>
           <a:lstStyle/>
+          <a:p>
+            <a:pPr marL="0" indent="0"/>
+            <a:r>
+              <a:rPr lang="en-CA" sz="2200" dirty="0" smtClean="0"/>
+              <a:t>Three parts of a language:</a:t>
+            </a:r>
+          </a:p>
+          <a:p>
+            <a:pPr marL="0" indent="0"/>
+            <a:endParaRPr lang="en-CA" sz="2200" dirty="0" smtClean="0"/>
+          </a:p>
           <a:p>
             <a:pPr>
               <a:buFont typeface="Arial" panose="020B0604020202020204" pitchFamily="34" charset="0"/>
@@ -6377,7 +6596,23 @@
             </a:pPr>
             <a:r>
               <a:rPr lang="en-CA" sz="2200" dirty="0" smtClean="0"/>
-              <a:t>The useable source code – Python Version(s) and Open-source community</a:t>
+              <a:t>Source </a:t>
+            </a:r>
+            <a:r>
+              <a:rPr lang="en-CA" sz="2200" dirty="0" smtClean="0"/>
+              <a:t>code – </a:t>
+            </a:r>
+            <a:r>
+              <a:rPr lang="en-CA" sz="2200" dirty="0" smtClean="0"/>
+              <a:t>Python </a:t>
+            </a:r>
+            <a:r>
+              <a:rPr lang="en-CA" sz="2200" dirty="0" smtClean="0"/>
+              <a:t>Version(s) and Open-source </a:t>
+            </a:r>
+            <a:r>
+              <a:rPr lang="en-CA" sz="2200" dirty="0" smtClean="0"/>
+              <a:t>packages</a:t>
             </a:r>
           </a:p>
           <a:p>
@@ -6417,17 +6652,6 @@
           <a:p>
             <a:pPr marL="0" indent="0"/>
             <a:endParaRPr lang="en-CA" sz="2200" dirty="0" smtClean="0"/>
-          </a:p>
-          <a:p>
-            <a:pPr marL="0" indent="0"/>
-            <a:r>
-              <a:rPr lang="en-CA" sz="2200" dirty="0"/>
-              <a:t>I</a:t>
-            </a:r>
-            <a:r>
-              <a:rPr lang="en-CA" sz="2200" dirty="0" smtClean="0"/>
-              <a:t>mplementation: Research more than automated tool</a:t>
-            </a:r>
           </a:p>
           <a:p>
             <a:endParaRPr lang="en-CA" sz="2200" dirty="0"/>
@@ -6444,6 +6668,13 @@
   <p:clrMapOvr>
     <a:masterClrMapping/>
   </p:clrMapOvr>
+  <p:timing>
+    <p:tnLst>
+      <p:par>
+        <p:cTn id="1" dur="indefinite" restart="never" nodeType="tmRoot"/>
+      </p:par>
+    </p:tnLst>
+  </p:timing>
 </p:sld>
 </file>
 
@@ -6477,7 +6708,7 @@
         <p:spPr>
           <a:xfrm>
             <a:off x="822960" y="1097280"/>
-            <a:ext cx="3244984" cy="3712464"/>
+            <a:ext cx="3965064" cy="5356056"/>
           </a:xfrm>
         </p:spPr>
         <p:txBody>
@@ -6486,12 +6717,21 @@
           </a:bodyPr>
           <a:lstStyle/>
           <a:p>
+            <a:pPr algn="ctr"/>
             <a:r>
               <a:rPr lang="en-CA" sz="2000" dirty="0" smtClean="0"/>
-              <a:t>1.0 VISUALIZATION</a:t>
-            </a:r>
-          </a:p>
-          <a:p>
+              <a:t>PART A – SOURCE</a:t>
+            </a:r>
+          </a:p>
+          <a:p>
+            <a:pPr algn="ctr"/>
+            <a:endParaRPr lang="en-CA" sz="2000" dirty="0" smtClean="0"/>
+          </a:p>
+          <a:p>
+            <a:r>
+              <a:rPr lang="en-CA" sz="2000" dirty="0" smtClean="0"/>
+              <a:t>1.0 – Visual inspection</a:t>
+            </a:r>
             <a:endParaRPr lang="en-CA" sz="2000" dirty="0" smtClean="0"/>
           </a:p>
           <a:p>
@@ -6501,7 +6741,11 @@
             </a:pPr>
             <a:r>
               <a:rPr lang="en-CA" sz="2000" dirty="0" smtClean="0"/>
-              <a:t>Watch GOURCE Video</a:t>
+              <a:t>Watch GOURCE </a:t>
+            </a:r>
+            <a:r>
+              <a:rPr lang="en-CA" sz="2000" dirty="0" smtClean="0"/>
+              <a:t>Video</a:t>
             </a:r>
           </a:p>
           <a:p>
@@ -6512,46 +6756,29 @@
             <a:endParaRPr lang="en-CA" sz="2000" dirty="0" smtClean="0"/>
           </a:p>
           <a:p>
+            <a:pPr marL="0" indent="0"/>
+            <a:r>
+              <a:rPr lang="en-CA" sz="2000" dirty="0" smtClean="0"/>
+              <a:t>2.0 – Statistics</a:t>
+            </a:r>
+          </a:p>
+          <a:p>
             <a:pPr>
               <a:buFont typeface="Arial" panose="020B0604020202020204" pitchFamily="34" charset="0"/>
               <a:buChar char="•"/>
             </a:pPr>
             <a:r>
+              <a:rPr lang="en-CA" sz="2000" dirty="0"/>
+              <a:t>Write </a:t>
+            </a:r>
+            <a:r>
               <a:rPr lang="en-CA" sz="2000" dirty="0" smtClean="0"/>
-              <a:t>Laws applied?</a:t>
-            </a:r>
-          </a:p>
-        </p:txBody>
-      </p:sp>
-      <p:sp>
-        <p:nvSpPr>
-          <p:cNvPr id="4" name="Content Placeholder 3"/>
-          <p:cNvSpPr>
-            <a:spLocks noGrp="1"/>
-          </p:cNvSpPr>
-          <p:nvPr>
-            <p:ph sz="half" idx="2"/>
-          </p:nvPr>
-        </p:nvSpPr>
-        <p:spPr>
-          <a:xfrm>
-            <a:off x="4355976" y="1124744"/>
-            <a:ext cx="3384376" cy="3712464"/>
-          </a:xfrm>
-        </p:spPr>
-        <p:txBody>
-          <a:bodyPr>
-            <a:normAutofit/>
-          </a:bodyPr>
-          <a:lstStyle/>
-          <a:p>
-            <a:r>
-              <a:rPr lang="en-CA" sz="2000" dirty="0" smtClean="0"/>
-              <a:t>2.0 STATISTICS</a:t>
-            </a:r>
-          </a:p>
-          <a:p>
-            <a:endParaRPr lang="en-CA" sz="2000" dirty="0"/>
+              <a:t>Script; get</a:t>
+            </a:r>
+            <a:r>
+              <a:rPr lang="en-CA" sz="2000" dirty="0"/>
+              <a:t>: name, date, size</a:t>
+            </a:r>
           </a:p>
           <a:p>
             <a:pPr>
@@ -6559,8 +6786,8 @@
               <a:buChar char="•"/>
             </a:pPr>
             <a:r>
-              <a:rPr lang="en-CA" sz="2000" dirty="0" smtClean="0"/>
-              <a:t>Write Script to parse Python Download page(s)</a:t>
+              <a:rPr lang="en-CA" sz="2000" dirty="0"/>
+              <a:t>Graph results</a:t>
             </a:r>
           </a:p>
           <a:p>
@@ -6570,8 +6797,50 @@
             </a:pPr>
             <a:r>
               <a:rPr lang="en-CA" sz="2000" dirty="0" smtClean="0"/>
-              <a:t>Get: name, date, size</a:t>
-            </a:r>
+              <a:t>Visit docs: What features </a:t>
+            </a:r>
+            <a:r>
+              <a:rPr lang="en-CA" sz="2000" dirty="0"/>
+              <a:t>added per release?</a:t>
+            </a:r>
+          </a:p>
+          <a:p>
+            <a:pPr marL="0" indent="0"/>
+            <a:endParaRPr lang="en-CA" sz="2000" dirty="0" smtClean="0"/>
+          </a:p>
+        </p:txBody>
+      </p:sp>
+      <p:sp>
+        <p:nvSpPr>
+          <p:cNvPr id="4" name="Content Placeholder 3"/>
+          <p:cNvSpPr>
+            <a:spLocks noGrp="1"/>
+          </p:cNvSpPr>
+          <p:nvPr>
+            <p:ph sz="half" idx="2"/>
+          </p:nvPr>
+        </p:nvSpPr>
+        <p:spPr>
+          <a:xfrm>
+            <a:off x="4860032" y="1124744"/>
+            <a:ext cx="3528392" cy="3712464"/>
+          </a:xfrm>
+        </p:spPr>
+        <p:txBody>
+          <a:bodyPr>
+            <a:normAutofit/>
+          </a:bodyPr>
+          <a:lstStyle/>
+          <a:p>
+            <a:pPr algn="ctr"/>
+            <a:r>
+              <a:rPr lang="en-CA" sz="2000" dirty="0" smtClean="0"/>
+              <a:t>PART B – PACKAGES</a:t>
+            </a:r>
+          </a:p>
+          <a:p>
+            <a:pPr algn="ctr"/>
+            <a:endParaRPr lang="en-CA" sz="2000" dirty="0" smtClean="0"/>
           </a:p>
           <a:p>
             <a:pPr>
@@ -6580,7 +6849,15 @@
             </a:pPr>
             <a:r>
               <a:rPr lang="en-CA" sz="2000" dirty="0" smtClean="0"/>
-              <a:t>Graph results</a:t>
+              <a:t>Visit </a:t>
+            </a:r>
+            <a:r>
+              <a:rPr lang="en-CA" sz="2000" dirty="0" err="1" smtClean="0"/>
+              <a:t>PyPi</a:t>
+            </a:r>
+            <a:r>
+              <a:rPr lang="en-CA" sz="2000" dirty="0" smtClean="0"/>
+              <a:t> package index</a:t>
             </a:r>
           </a:p>
           <a:p>
@@ -6590,9 +6867,18 @@
             </a:pPr>
             <a:r>
               <a:rPr lang="en-CA" sz="2000" dirty="0" smtClean="0"/>
-              <a:t>What/Number of features added per release?</a:t>
-            </a:r>
-            <a:endParaRPr lang="en-CA" sz="2000" dirty="0"/>
+              <a:t>Write script; get name, upload date(s), size(s)</a:t>
+            </a:r>
+          </a:p>
+          <a:p>
+            <a:pPr>
+              <a:buFont typeface="Arial" panose="020B0604020202020204" pitchFamily="34" charset="0"/>
+              <a:buChar char="•"/>
+            </a:pPr>
+            <a:r>
+              <a:rPr lang="en-CA" sz="2000" dirty="0" smtClean="0"/>
+              <a:t>Graph results</a:t>
+            </a:r>
           </a:p>
         </p:txBody>
       </p:sp>
@@ -6611,9 +6897,14 @@
           <a:bodyPr/>
           <a:lstStyle/>
           <a:p>
+            <a:pPr algn="ctr"/>
             <a:r>
               <a:rPr lang="en-CA" dirty="0" smtClean="0"/>
-              <a:t>Methodology 1 – SOURCE AND PACKAGES</a:t>
+              <a:t>Methodology </a:t>
+            </a:r>
+            <a:r>
+              <a:rPr lang="en-CA" dirty="0" smtClean="0"/>
+              <a:t>1</a:t>
             </a:r>
             <a:endParaRPr lang="en-CA" dirty="0"/>
           </a:p>
@@ -6629,6 +6920,13 @@
   <p:clrMapOvr>
     <a:masterClrMapping/>
   </p:clrMapOvr>
+  <p:timing>
+    <p:tnLst>
+      <p:par>
+        <p:cTn id="1" dur="indefinite" restart="never" nodeType="tmRoot"/>
+      </p:par>
+    </p:tnLst>
+  </p:timing>
 </p:sld>
 </file>
 
@@ -6664,13 +6962,29 @@
           <a:bodyPr/>
           <a:lstStyle/>
           <a:p>
+            <a:pPr algn="ctr"/>
             <a:r>
               <a:rPr lang="en-CA" dirty="0"/>
               <a:t>Methodology </a:t>
             </a:r>
             <a:r>
               <a:rPr lang="en-CA" dirty="0" smtClean="0"/>
-              <a:t>2 – SUPPORTED PROJECTS</a:t>
+              <a:t>2 </a:t>
+            </a:r>
+            <a:r>
+              <a:rPr lang="en-CA" dirty="0"/>
+              <a:t/>
+            </a:r>
+            <a:br>
+              <a:rPr lang="en-CA" dirty="0"/>
+            </a:br>
+            <a:r>
+              <a:rPr lang="en-CA" dirty="0" smtClean="0"/>
+              <a:t>SUPPORTED </a:t>
+            </a:r>
+            <a:r>
+              <a:rPr lang="en-CA" dirty="0" smtClean="0"/>
+              <a:t>PROJECTS</a:t>
             </a:r>
             <a:endParaRPr lang="en-CA" dirty="0"/>
           </a:p>
@@ -6758,6 +7072,13 @@
   <p:clrMapOvr>
     <a:masterClrMapping/>
   </p:clrMapOvr>
+  <p:timing>
+    <p:tnLst>
+      <p:par>
+        <p:cTn id="1" dur="indefinite" restart="never" nodeType="tmRoot"/>
+      </p:par>
+    </p:tnLst>
+  </p:timing>
 </p:sld>
 </file>
 
@@ -6793,13 +7114,25 @@
           <a:bodyPr/>
           <a:lstStyle/>
           <a:p>
+            <a:pPr algn="ctr"/>
             <a:r>
               <a:rPr lang="en-CA" dirty="0"/>
               <a:t>Methodology </a:t>
             </a:r>
             <a:r>
               <a:rPr lang="en-CA" dirty="0" smtClean="0"/>
-              <a:t>3 – USER BASE</a:t>
+              <a:t>3</a:t>
+            </a:r>
+            <a:br>
+              <a:rPr lang="en-CA" dirty="0" smtClean="0"/>
+            </a:br>
+            <a:r>
+              <a:rPr lang="en-CA" dirty="0" smtClean="0"/>
+              <a:t>USER </a:t>
+            </a:r>
+            <a:r>
+              <a:rPr lang="en-CA" dirty="0" smtClean="0"/>
+              <a:t>BASE</a:t>
             </a:r>
             <a:endParaRPr lang="en-CA" dirty="0"/>
           </a:p>
@@ -6872,93 +7205,17 @@
   <p:clrMapOvr>
     <a:masterClrMapping/>
   </p:clrMapOvr>
+  <p:timing>
+    <p:tnLst>
+      <p:par>
+        <p:cTn id="1" dur="indefinite" restart="never" nodeType="tmRoot"/>
+      </p:par>
+    </p:tnLst>
+  </p:timing>
 </p:sld>
 </file>
 
 <file path=ppt/slides/slide7.xml><?xml version="1.0" encoding="utf-8"?>
-<p:sld xmlns:a="http://schemas.openxmlformats.org/drawingml/2006/main" xmlns:r="http://schemas.openxmlformats.org/officeDocument/2006/relationships" xmlns:p="http://schemas.openxmlformats.org/presentationml/2006/main">
-  <p:cSld>
-    <p:spTree>
-      <p:nvGrpSpPr>
-        <p:cNvPr id="1" name=""/>
-        <p:cNvGrpSpPr/>
-        <p:nvPr/>
-      </p:nvGrpSpPr>
-      <p:grpSpPr>
-        <a:xfrm>
-          <a:off x="0" y="0"/>
-          <a:ext cx="0" cy="0"/>
-          <a:chOff x="0" y="0"/>
-          <a:chExt cx="0" cy="0"/>
-        </a:xfrm>
-      </p:grpSpPr>
-      <p:sp>
-        <p:nvSpPr>
-          <p:cNvPr id="2" name="Title 1"/>
-          <p:cNvSpPr>
-            <a:spLocks noGrp="1"/>
-          </p:cNvSpPr>
-          <p:nvPr>
-            <p:ph type="title"/>
-          </p:nvPr>
-        </p:nvSpPr>
-        <p:spPr/>
-        <p:txBody>
-          <a:bodyPr/>
-          <a:lstStyle/>
-          <a:p>
-            <a:r>
-              <a:rPr lang="en-CA" dirty="0" smtClean="0"/>
-              <a:t>RESULTS M1 – PART A</a:t>
-            </a:r>
-            <a:endParaRPr lang="en-CA" dirty="0"/>
-          </a:p>
-        </p:txBody>
-      </p:sp>
-      <p:sp>
-        <p:nvSpPr>
-          <p:cNvPr id="3" name="Content Placeholder 2"/>
-          <p:cNvSpPr>
-            <a:spLocks noGrp="1"/>
-          </p:cNvSpPr>
-          <p:nvPr>
-            <p:ph idx="1"/>
-          </p:nvPr>
-        </p:nvSpPr>
-        <p:spPr>
-          <a:xfrm>
-            <a:off x="822960" y="1100628"/>
-            <a:ext cx="7520940" cy="3840540"/>
-          </a:xfrm>
-        </p:spPr>
-        <p:txBody>
-          <a:bodyPr>
-            <a:normAutofit/>
-          </a:bodyPr>
-          <a:lstStyle/>
-          <a:p>
-            <a:r>
-              <a:rPr lang="en-CA" dirty="0" smtClean="0"/>
-              <a:t>M1 – PART A - proved 3 laws (continuous change, maintaining complexity, and continuous growth)</a:t>
-            </a:r>
-            <a:endParaRPr lang="en-CA" dirty="0"/>
-          </a:p>
-        </p:txBody>
-      </p:sp>
-    </p:spTree>
-    <p:extLst>
-      <p:ext uri="{BB962C8B-B14F-4D97-AF65-F5344CB8AC3E}">
-        <p14:creationId xmlns:p14="http://schemas.microsoft.com/office/powerpoint/2010/main" val="3550136975"/>
-      </p:ext>
-    </p:extLst>
-  </p:cSld>
-  <p:clrMapOvr>
-    <a:masterClrMapping/>
-  </p:clrMapOvr>
-</p:sld>
-</file>
-
-<file path=ppt/slides/slide8.xml><?xml version="1.0" encoding="utf-8"?>
 <p:sld xmlns:a="http://schemas.openxmlformats.org/drawingml/2006/main" xmlns:r="http://schemas.openxmlformats.org/officeDocument/2006/relationships" xmlns:p="http://schemas.openxmlformats.org/presentationml/2006/main">
   <p:cSld>
     <p:spTree>
@@ -6999,7 +7256,7 @@
         </p:blipFill>
         <p:spPr>
           <a:xfrm>
-            <a:off x="107504" y="1340768"/>
+            <a:off x="179512" y="3212976"/>
             <a:ext cx="4318835" cy="2509455"/>
           </a:xfrm>
         </p:spPr>
@@ -7028,7 +7285,7 @@
         </p:blipFill>
         <p:spPr>
           <a:xfrm>
-            <a:off x="4499992" y="1340769"/>
+            <a:off x="4572000" y="3212977"/>
             <a:ext cx="4438844" cy="2520279"/>
           </a:xfrm>
         </p:spPr>
@@ -7048,9 +7305,10 @@
           <a:bodyPr/>
           <a:lstStyle/>
           <a:p>
-            <a:r>
-              <a:rPr lang="en-CA" dirty="0" smtClean="0"/>
-              <a:t>GOURCE SCREENSHOTS / COMPLEXITY VISUAL</a:t>
+            <a:pPr algn="ctr"/>
+            <a:r>
+              <a:rPr lang="en-CA" dirty="0"/>
+              <a:t>RESULTS M1 – PART A</a:t>
             </a:r>
             <a:endParaRPr lang="en-CA" dirty="0"/>
           </a:p>
@@ -7064,8 +7322,8 @@
         </p:nvSpPr>
         <p:spPr>
           <a:xfrm>
-            <a:off x="395536" y="4637613"/>
-            <a:ext cx="4968027" cy="369332"/>
+            <a:off x="5736265" y="6514311"/>
+            <a:ext cx="3369833" cy="276999"/>
           </a:xfrm>
           <a:prstGeom prst="rect">
             <a:avLst/>
@@ -7079,10 +7337,74 @@
           <a:lstStyle/>
           <a:p>
             <a:r>
-              <a:rPr lang="en-CA" dirty="0" smtClean="0"/>
+              <a:rPr lang="en-CA" sz="1200" i="1" dirty="0" smtClean="0"/>
               <a:t>Check out my M1 README for all screenshots</a:t>
             </a:r>
-            <a:endParaRPr lang="en-CA" dirty="0"/>
+            <a:endParaRPr lang="en-CA" sz="1200" i="1" dirty="0"/>
+          </a:p>
+        </p:txBody>
+      </p:sp>
+      <p:sp>
+        <p:nvSpPr>
+          <p:cNvPr id="2" name="TextBox 1"/>
+          <p:cNvSpPr txBox="1"/>
+          <p:nvPr/>
+        </p:nvSpPr>
+        <p:spPr>
+          <a:xfrm>
+            <a:off x="683568" y="1268760"/>
+            <a:ext cx="6840760" cy="1446550"/>
+          </a:xfrm>
+          <a:prstGeom prst="rect">
+            <a:avLst/>
+          </a:prstGeom>
+          <a:noFill/>
+        </p:spPr>
+        <p:txBody>
+          <a:bodyPr wrap="square" rtlCol="0">
+            <a:spAutoFit/>
+          </a:bodyPr>
+          <a:lstStyle/>
+          <a:p>
+            <a:r>
+              <a:rPr lang="en-CA" sz="2200" b="1" dirty="0" err="1" smtClean="0"/>
+              <a:t>Gource</a:t>
+            </a:r>
+            <a:r>
+              <a:rPr lang="en-CA" sz="2200" b="1" dirty="0" smtClean="0"/>
+              <a:t> Visualization asserted:</a:t>
+            </a:r>
+          </a:p>
+          <a:p>
+            <a:pPr marL="285750" indent="-285750">
+              <a:buFont typeface="Arial" charset="0"/>
+              <a:buChar char="•"/>
+            </a:pPr>
+            <a:r>
+              <a:rPr lang="en-CA" sz="2200" b="1" dirty="0" smtClean="0"/>
+              <a:t>Continuous change</a:t>
+            </a:r>
+          </a:p>
+          <a:p>
+            <a:pPr marL="285750" indent="-285750">
+              <a:buFont typeface="Arial" charset="0"/>
+              <a:buChar char="•"/>
+            </a:pPr>
+            <a:r>
+              <a:rPr lang="en-CA" sz="2200" b="1" dirty="0" smtClean="0"/>
+              <a:t>Increasing complexity (+ maintenance)</a:t>
+            </a:r>
+          </a:p>
+          <a:p>
+            <a:pPr marL="285750" indent="-285750">
+              <a:buFont typeface="Arial" charset="0"/>
+              <a:buChar char="•"/>
+            </a:pPr>
+            <a:r>
+              <a:rPr lang="en-CA" sz="2200" b="1" dirty="0" smtClean="0"/>
+              <a:t>Continuous growth</a:t>
+            </a:r>
+            <a:endParaRPr lang="en-CA" sz="2200" b="1" dirty="0"/>
           </a:p>
         </p:txBody>
       </p:sp>
@@ -7096,6 +7418,157 @@
   <p:clrMapOvr>
     <a:masterClrMapping/>
   </p:clrMapOvr>
+  <p:timing>
+    <p:tnLst>
+      <p:par>
+        <p:cTn id="1" dur="indefinite" restart="never" nodeType="tmRoot"/>
+      </p:par>
+    </p:tnLst>
+  </p:timing>
+</p:sld>
+</file>
+
+<file path=ppt/slides/slide8.xml><?xml version="1.0" encoding="utf-8"?>
+<p:sld xmlns:a="http://schemas.openxmlformats.org/drawingml/2006/main" xmlns:r="http://schemas.openxmlformats.org/officeDocument/2006/relationships" xmlns:p="http://schemas.openxmlformats.org/presentationml/2006/main">
+  <p:cSld>
+    <p:spTree>
+      <p:nvGrpSpPr>
+        <p:cNvPr id="1" name=""/>
+        <p:cNvGrpSpPr/>
+        <p:nvPr/>
+      </p:nvGrpSpPr>
+      <p:grpSpPr>
+        <a:xfrm>
+          <a:off x="0" y="0"/>
+          <a:ext cx="0" cy="0"/>
+          <a:chOff x="0" y="0"/>
+          <a:chExt cx="0" cy="0"/>
+        </a:xfrm>
+      </p:grpSpPr>
+      <p:sp>
+        <p:nvSpPr>
+          <p:cNvPr id="2" name="Title 1"/>
+          <p:cNvSpPr>
+            <a:spLocks noGrp="1"/>
+          </p:cNvSpPr>
+          <p:nvPr>
+            <p:ph type="title"/>
+          </p:nvPr>
+        </p:nvSpPr>
+        <p:spPr/>
+        <p:txBody>
+          <a:bodyPr/>
+          <a:lstStyle/>
+          <a:p>
+            <a:pPr algn="ctr"/>
+            <a:r>
+              <a:rPr lang="en-CA" dirty="0" smtClean="0"/>
+              <a:t>RESULTS – m1 part b</a:t>
+            </a:r>
+            <a:endParaRPr lang="en-CA" dirty="0"/>
+          </a:p>
+        </p:txBody>
+      </p:sp>
+      <p:sp>
+        <p:nvSpPr>
+          <p:cNvPr id="3" name="Content Placeholder 2"/>
+          <p:cNvSpPr>
+            <a:spLocks noGrp="1"/>
+          </p:cNvSpPr>
+          <p:nvPr>
+            <p:ph idx="1"/>
+          </p:nvPr>
+        </p:nvSpPr>
+        <p:spPr/>
+        <p:txBody>
+          <a:bodyPr>
+            <a:normAutofit/>
+          </a:bodyPr>
+          <a:lstStyle/>
+          <a:p>
+            <a:pPr>
+              <a:buFont typeface="Arial" panose="020B0604020202020204" pitchFamily="34" charset="0"/>
+              <a:buChar char="•"/>
+            </a:pPr>
+            <a:r>
+              <a:rPr lang="en-CA" sz="2200" dirty="0" smtClean="0"/>
+              <a:t>Also: continuous change, increasing complexity, continuous growth</a:t>
+            </a:r>
+          </a:p>
+          <a:p>
+            <a:pPr>
+              <a:buFont typeface="Arial" panose="020B0604020202020204" pitchFamily="34" charset="0"/>
+              <a:buChar char="•"/>
+            </a:pPr>
+            <a:endParaRPr lang="en-CA" sz="2200" dirty="0" smtClean="0"/>
+          </a:p>
+          <a:p>
+            <a:pPr>
+              <a:buFont typeface="Arial" panose="020B0604020202020204" pitchFamily="34" charset="0"/>
+              <a:buChar char="•"/>
+            </a:pPr>
+            <a:r>
+              <a:rPr lang="en-CA" sz="2200" dirty="0" smtClean="0"/>
+              <a:t>New: law </a:t>
+            </a:r>
+            <a:r>
+              <a:rPr lang="en-CA" sz="2200" dirty="0"/>
+              <a:t>of familiarity </a:t>
+            </a:r>
+            <a:r>
+              <a:rPr lang="en-CA" sz="2200" b="0" i="1" dirty="0" smtClean="0"/>
+              <a:t>forced </a:t>
+            </a:r>
+            <a:r>
+              <a:rPr lang="en-CA" sz="2200" b="0" i="1" dirty="0"/>
+              <a:t>to update in order to keep same </a:t>
+            </a:r>
+            <a:r>
+              <a:rPr lang="en-CA" sz="2200" b="0" i="1" dirty="0" smtClean="0"/>
+              <a:t>functionality</a:t>
+            </a:r>
+          </a:p>
+          <a:p>
+            <a:endParaRPr lang="en-CA" sz="2200" dirty="0"/>
+          </a:p>
+          <a:p>
+            <a:r>
+              <a:rPr lang="en-CA" sz="2200" dirty="0" smtClean="0"/>
+              <a:t>Problem: </a:t>
+            </a:r>
+            <a:r>
+              <a:rPr lang="en-CA" sz="2200" dirty="0" smtClean="0"/>
+              <a:t>Data </a:t>
+            </a:r>
+            <a:r>
+              <a:rPr lang="en-CA" sz="2200" dirty="0" smtClean="0"/>
+              <a:t>not </a:t>
+            </a:r>
+            <a:r>
+              <a:rPr lang="en-CA" sz="2200" dirty="0" smtClean="0"/>
+              <a:t>available! </a:t>
+            </a:r>
+            <a:endParaRPr lang="en-CA" sz="2200" dirty="0" smtClean="0"/>
+          </a:p>
+        </p:txBody>
+      </p:sp>
+    </p:spTree>
+    <p:extLst>
+      <p:ext uri="{BB962C8B-B14F-4D97-AF65-F5344CB8AC3E}">
+        <p14:creationId xmlns:p14="http://schemas.microsoft.com/office/powerpoint/2010/main" val="4278832845"/>
+      </p:ext>
+    </p:extLst>
+  </p:cSld>
+  <p:clrMapOvr>
+    <a:masterClrMapping/>
+  </p:clrMapOvr>
+  <p:timing>
+    <p:tnLst>
+      <p:par>
+        <p:cTn id="1" dur="indefinite" restart="never" nodeType="tmRoot"/>
+      </p:par>
+    </p:tnLst>
+  </p:timing>
 </p:sld>
 </file>
 
@@ -7131,9 +7604,14 @@
           <a:bodyPr/>
           <a:lstStyle/>
           <a:p>
+            <a:pPr algn="ctr"/>
             <a:r>
               <a:rPr lang="en-CA" dirty="0" smtClean="0"/>
-              <a:t>RESULTS – m1 part b</a:t>
+              <a:t>RESULTS – </a:t>
+            </a:r>
+            <a:r>
+              <a:rPr lang="en-CA" dirty="0" smtClean="0"/>
+              <a:t>M2 </a:t>
             </a:r>
             <a:endParaRPr lang="en-CA" dirty="0"/>
           </a:p>
@@ -7149,57 +7627,115 @@
             <p:ph idx="1"/>
           </p:nvPr>
         </p:nvSpPr>
-        <p:spPr/>
-        <p:txBody>
-          <a:bodyPr/>
+        <p:spPr>
+          <a:xfrm>
+            <a:off x="682980" y="1108726"/>
+            <a:ext cx="7520940" cy="3579849"/>
+          </a:xfrm>
+        </p:spPr>
+        <p:txBody>
+          <a:bodyPr>
+            <a:normAutofit/>
+          </a:bodyPr>
           <a:lstStyle/>
           <a:p>
             <a:pPr>
-              <a:buFont typeface="Arial" panose="020B0604020202020204" pitchFamily="34" charset="0"/>
+              <a:buFont typeface="Arial" charset="0"/>
               <a:buChar char="•"/>
             </a:pPr>
             <a:r>
-              <a:rPr lang="en-CA" dirty="0" smtClean="0"/>
-              <a:t>Also asserted same laws</a:t>
-            </a:r>
+              <a:rPr lang="en-CA" sz="2000" dirty="0" smtClean="0"/>
+              <a:t>Not </a:t>
+            </a:r>
+            <a:r>
+              <a:rPr lang="en-CA" sz="2000" dirty="0"/>
+              <a:t>show that Python itself had evolved </a:t>
+            </a:r>
+            <a:endParaRPr lang="en-CA" sz="2000" dirty="0" smtClean="0"/>
           </a:p>
           <a:p>
             <a:pPr>
-              <a:buFont typeface="Arial" panose="020B0604020202020204" pitchFamily="34" charset="0"/>
+              <a:buFont typeface="Arial" charset="0"/>
               <a:buChar char="•"/>
             </a:pPr>
             <a:r>
-              <a:rPr lang="en-CA" dirty="0" smtClean="0"/>
-              <a:t>law </a:t>
-            </a:r>
-            <a:r>
-              <a:rPr lang="en-CA" dirty="0"/>
-              <a:t>of familiarity – forced to update in order to keep same </a:t>
-            </a:r>
-            <a:r>
-              <a:rPr lang="en-CA" dirty="0" smtClean="0"/>
-              <a:t>functionality</a:t>
-            </a:r>
-          </a:p>
-          <a:p>
-            <a:endParaRPr lang="en-CA" dirty="0"/>
-          </a:p>
-          <a:p>
-            <a:r>
-              <a:rPr lang="en-CA" dirty="0" smtClean="0"/>
-              <a:t>Problem: 	Data not available (current vs history of package)</a:t>
-            </a:r>
-            <a:endParaRPr lang="en-CA" dirty="0"/>
-          </a:p>
-          <a:p>
-            <a:endParaRPr lang="en-CA" dirty="0" smtClean="0"/>
-          </a:p>
-        </p:txBody>
-      </p:sp>
+              <a:rPr lang="en-CA" sz="2000" dirty="0" smtClean="0"/>
+              <a:t>Python </a:t>
+            </a:r>
+            <a:r>
+              <a:rPr lang="en-CA" sz="2000" dirty="0"/>
+              <a:t>has just been chosen for </a:t>
+            </a:r>
+            <a:r>
+              <a:rPr lang="en-CA" sz="2000" dirty="0" smtClean="0"/>
+              <a:t>use</a:t>
+            </a:r>
+            <a:endParaRPr lang="en-CA" sz="2000" dirty="0" smtClean="0"/>
+          </a:p>
+          <a:p>
+            <a:pPr>
+              <a:buFont typeface="Arial" charset="0"/>
+              <a:buChar char="•"/>
+            </a:pPr>
+            <a:r>
+              <a:rPr lang="en-CA" sz="2000" dirty="0" smtClean="0"/>
+              <a:t>Indirectly </a:t>
+            </a:r>
+            <a:r>
+              <a:rPr lang="en-CA" sz="2000" dirty="0"/>
+              <a:t>asserted Law VIII (feedback</a:t>
+            </a:r>
+            <a:r>
+              <a:rPr lang="en-CA" sz="2000" dirty="0" smtClean="0"/>
+              <a:t>)</a:t>
+            </a:r>
+          </a:p>
+          <a:p>
+            <a:pPr>
+              <a:buFont typeface="Arial" charset="0"/>
+              <a:buChar char="•"/>
+            </a:pPr>
+            <a:endParaRPr lang="en-CA" sz="2000" dirty="0"/>
+          </a:p>
+          <a:p>
+            <a:endParaRPr lang="en-CA" sz="2000" dirty="0"/>
+          </a:p>
+        </p:txBody>
+      </p:sp>
+      <p:pic>
+        <p:nvPicPr>
+          <p:cNvPr id="4" name="Picture 3"/>
+          <p:cNvPicPr>
+            <a:picLocks noChangeAspect="1"/>
+          </p:cNvPicPr>
+          <p:nvPr/>
+        </p:nvPicPr>
+        <p:blipFill>
+          <a:blip r:embed="rId3">
+            <a:extLst>
+              <a:ext uri="{28A0092B-C50C-407E-A947-70E740481C1C}">
+                <a14:useLocalDpi xmlns:a14="http://schemas.microsoft.com/office/drawing/2010/main" val="0"/>
+              </a:ext>
+            </a:extLst>
+          </a:blip>
+          <a:stretch>
+            <a:fillRect/>
+          </a:stretch>
+        </p:blipFill>
+        <p:spPr>
+          <a:xfrm>
+            <a:off x="1259632" y="2898651"/>
+            <a:ext cx="6367636" cy="3537576"/>
+          </a:xfrm>
+          <a:prstGeom prst="rect">
+            <a:avLst/>
+          </a:prstGeom>
+        </p:spPr>
+      </p:pic>
     </p:spTree>
     <p:extLst>
       <p:ext uri="{BB962C8B-B14F-4D97-AF65-F5344CB8AC3E}">
-        <p14:creationId xmlns:p14="http://schemas.microsoft.com/office/powerpoint/2010/main" val="4278832845"/>
+        <p14:creationId xmlns:p14="http://schemas.microsoft.com/office/powerpoint/2010/main" val="3521685727"/>
       </p:ext>
     </p:extLst>
   </p:cSld>

</xml_diff>